<commit_message>
Deployed a4eca05 with MkDocs version: 1.1.2
</commit_message>
<xml_diff>
--- a/presentations/Graph-Systems-Thinking-Half-Day-Workshop.pptx
+++ b/presentations/Graph-Systems-Thinking-Half-Day-Workshop.pptx
@@ -17079,7 +17079,7 @@
         </p:nvCxnSpPr>
         <p:spPr>
           <a:xfrm flipV="1">
-            <a:off x="5541806" y="711373"/>
+            <a:off x="5100371" y="608509"/>
             <a:ext cx="1484636" cy="251153"/>
           </a:xfrm>
           <a:prstGeom prst="line">
@@ -17139,7 +17139,7 @@
         </p:nvSpPr>
         <p:spPr>
           <a:xfrm rot="20997008">
-            <a:off x="5603627" y="182686"/>
+            <a:off x="5162192" y="79822"/>
             <a:ext cx="984745" cy="795112"/>
           </a:xfrm>
           <a:prstGeom prst="rect">
@@ -47045,8 +47045,8 @@
         </p:nvSpPr>
         <p:spPr>
           <a:xfrm>
-            <a:off x="6474571" y="2743967"/>
-            <a:ext cx="4336092" cy="369332"/>
+            <a:off x="6474570" y="2743967"/>
+            <a:ext cx="4971195" cy="400110"/>
           </a:xfrm>
           <a:prstGeom prst="rect">
             <a:avLst/>
@@ -47060,7 +47060,7 @@
           <a:lstStyle/>
           <a:p>
             <a:r>
-              <a:rPr lang="en-US" dirty="0"/>
+              <a:rPr lang="en-US" sz="2000" dirty="0"/>
               <a:t>https://www.linkedin.com/in/danmccreary</a:t>
             </a:r>
           </a:p>
@@ -47197,8 +47197,8 @@
         </p:blipFill>
         <p:spPr>
           <a:xfrm>
-            <a:off x="5986961" y="4110761"/>
-            <a:ext cx="406137" cy="448888"/>
+            <a:off x="5843753" y="4110761"/>
+            <a:ext cx="549346" cy="607172"/>
           </a:xfrm>
           <a:prstGeom prst="rect">
             <a:avLst/>
@@ -47219,8 +47219,8 @@
         </p:nvSpPr>
         <p:spPr>
           <a:xfrm>
-            <a:off x="6393097" y="4110760"/>
-            <a:ext cx="1000915" cy="281167"/>
+            <a:off x="6474570" y="4117209"/>
+            <a:ext cx="1780296" cy="461665"/>
           </a:xfrm>
           <a:prstGeom prst="rect">
             <a:avLst/>
@@ -47234,7 +47234,7 @@
           <a:lstStyle/>
           <a:p>
             <a:r>
-              <a:rPr lang="en-US" sz="1227" dirty="0"/>
+              <a:rPr lang="en-US" sz="2400" dirty="0"/>
               <a:t>@dmccreary</a:t>
             </a:r>
           </a:p>

</xml_diff>